<commit_message>
Update ho3 ppt include >2 PEs
</commit_message>
<xml_diff>
--- a/lectures/hands-on-3+washup.pptx
+++ b/lectures/hands-on-3+washup.pptx
@@ -4843,7 +4843,7 @@
           <a:p>
             <a:r>
               <a:rPr lang="en-US" dirty="0"/>
-              <a:t>Perform Matrix-Vector Multiplication on a Two adjacent Pes</a:t>
+              <a:t>Perform Matrix-Vector Multiplication on multiple adjacent PEs</a:t>
             </a:r>
           </a:p>
           <a:p>
@@ -4873,7 +4873,7 @@
             <a:pPr lvl="1"/>
             <a:r>
               <a:rPr lang="en-US" dirty="0"/>
-              <a:t>N columns will be split across the two PEs</a:t>
+              <a:t>N columns will be split across the multiple PEs</a:t>
             </a:r>
           </a:p>
           <a:p>
@@ -4886,7 +4886,7 @@
             <a:pPr lvl="1"/>
             <a:r>
               <a:rPr lang="en-US" dirty="0"/>
-              <a:t>x will be split across two PEs</a:t>
+              <a:t>x will be split across multiple PEs</a:t>
             </a:r>
           </a:p>
           <a:p>
@@ -5027,6 +5027,15 @@
             <a:r>
               <a:rPr lang="en-US" dirty="0"/>
               <a:t> details for reduction</a:t>
+            </a:r>
+          </a:p>
+          <a:p>
+            <a:endParaRPr lang="en-US" dirty="0"/>
+          </a:p>
+          <a:p>
+            <a:r>
+              <a:rPr lang="en-US" dirty="0"/>
+              <a:t>TO DO 2: What needs to be changed to run on more than 2, say 4 PEs?</a:t>
             </a:r>
           </a:p>
           <a:p>

</xml_diff>